<commit_message>
PRL - going good
</commit_message>
<xml_diff>
--- a/SIT IN LASERS/SIT mode-locking in QCLs.pptx
+++ b/SIT IN LASERS/SIT mode-locking in QCLs.pptx
@@ -252,7 +252,7 @@
           <a:p>
             <a:fld id="{75B4C1AC-5A76-43D9-AC6F-061795F007D4}" type="datetimeFigureOut">
               <a:rPr lang="en-GB" smtClean="0"/>
-              <a:t>17/11/2016</a:t>
+              <a:t>20/01/2017</a:t>
             </a:fld>
             <a:endParaRPr lang="en-GB"/>
           </a:p>
@@ -422,7 +422,7 @@
           <a:p>
             <a:fld id="{75B4C1AC-5A76-43D9-AC6F-061795F007D4}" type="datetimeFigureOut">
               <a:rPr lang="en-GB" smtClean="0"/>
-              <a:t>17/11/2016</a:t>
+              <a:t>20/01/2017</a:t>
             </a:fld>
             <a:endParaRPr lang="en-GB"/>
           </a:p>
@@ -602,7 +602,7 @@
           <a:p>
             <a:fld id="{75B4C1AC-5A76-43D9-AC6F-061795F007D4}" type="datetimeFigureOut">
               <a:rPr lang="en-GB" smtClean="0"/>
-              <a:t>17/11/2016</a:t>
+              <a:t>20/01/2017</a:t>
             </a:fld>
             <a:endParaRPr lang="en-GB"/>
           </a:p>
@@ -772,7 +772,7 @@
           <a:p>
             <a:fld id="{75B4C1AC-5A76-43D9-AC6F-061795F007D4}" type="datetimeFigureOut">
               <a:rPr lang="en-GB" smtClean="0"/>
-              <a:t>17/11/2016</a:t>
+              <a:t>20/01/2017</a:t>
             </a:fld>
             <a:endParaRPr lang="en-GB"/>
           </a:p>
@@ -1018,7 +1018,7 @@
           <a:p>
             <a:fld id="{75B4C1AC-5A76-43D9-AC6F-061795F007D4}" type="datetimeFigureOut">
               <a:rPr lang="en-GB" smtClean="0"/>
-              <a:t>17/11/2016</a:t>
+              <a:t>20/01/2017</a:t>
             </a:fld>
             <a:endParaRPr lang="en-GB"/>
           </a:p>
@@ -1250,7 +1250,7 @@
           <a:p>
             <a:fld id="{75B4C1AC-5A76-43D9-AC6F-061795F007D4}" type="datetimeFigureOut">
               <a:rPr lang="en-GB" smtClean="0"/>
-              <a:t>17/11/2016</a:t>
+              <a:t>20/01/2017</a:t>
             </a:fld>
             <a:endParaRPr lang="en-GB"/>
           </a:p>
@@ -1617,7 +1617,7 @@
           <a:p>
             <a:fld id="{75B4C1AC-5A76-43D9-AC6F-061795F007D4}" type="datetimeFigureOut">
               <a:rPr lang="en-GB" smtClean="0"/>
-              <a:t>17/11/2016</a:t>
+              <a:t>20/01/2017</a:t>
             </a:fld>
             <a:endParaRPr lang="en-GB"/>
           </a:p>
@@ -1735,7 +1735,7 @@
           <a:p>
             <a:fld id="{75B4C1AC-5A76-43D9-AC6F-061795F007D4}" type="datetimeFigureOut">
               <a:rPr lang="en-GB" smtClean="0"/>
-              <a:t>17/11/2016</a:t>
+              <a:t>20/01/2017</a:t>
             </a:fld>
             <a:endParaRPr lang="en-GB"/>
           </a:p>
@@ -1830,7 +1830,7 @@
           <a:p>
             <a:fld id="{75B4C1AC-5A76-43D9-AC6F-061795F007D4}" type="datetimeFigureOut">
               <a:rPr lang="en-GB" smtClean="0"/>
-              <a:t>17/11/2016</a:t>
+              <a:t>20/01/2017</a:t>
             </a:fld>
             <a:endParaRPr lang="en-GB"/>
           </a:p>
@@ -2107,7 +2107,7 @@
           <a:p>
             <a:fld id="{75B4C1AC-5A76-43D9-AC6F-061795F007D4}" type="datetimeFigureOut">
               <a:rPr lang="en-GB" smtClean="0"/>
-              <a:t>17/11/2016</a:t>
+              <a:t>20/01/2017</a:t>
             </a:fld>
             <a:endParaRPr lang="en-GB"/>
           </a:p>
@@ -2360,7 +2360,7 @@
           <a:p>
             <a:fld id="{75B4C1AC-5A76-43D9-AC6F-061795F007D4}" type="datetimeFigureOut">
               <a:rPr lang="en-GB" smtClean="0"/>
-              <a:t>17/11/2016</a:t>
+              <a:t>20/01/2017</a:t>
             </a:fld>
             <a:endParaRPr lang="en-GB"/>
           </a:p>
@@ -2573,7 +2573,7 @@
           <a:p>
             <a:fld id="{75B4C1AC-5A76-43D9-AC6F-061795F007D4}" type="datetimeFigureOut">
               <a:rPr lang="en-GB" smtClean="0"/>
-              <a:t>17/11/2016</a:t>
+              <a:t>20/01/2017</a:t>
             </a:fld>
             <a:endParaRPr lang="en-GB"/>
           </a:p>
@@ -3243,7 +3243,7 @@
           <a:graphicData uri="http://schemas.openxmlformats.org/presentationml/2006/ole">
             <mc:AlternateContent xmlns:mc="http://schemas.openxmlformats.org/markup-compatibility/2006">
               <mc:Choice xmlns:v="urn:schemas-microsoft-com:vml" Requires="v">
-                <p:oleObj spid="_x0000_s3158" name="Equation" r:id="rId3" imgW="2844720" imgH="1434960" progId="Equation.DSMT4">
+                <p:oleObj spid="_x0000_s3161" name="Equation" r:id="rId3" imgW="2844720" imgH="1434960" progId="Equation.DSMT4">
                   <p:embed/>
                 </p:oleObj>
               </mc:Choice>
@@ -3305,7 +3305,7 @@
           <a:graphicData uri="http://schemas.openxmlformats.org/presentationml/2006/ole">
             <mc:AlternateContent xmlns:mc="http://schemas.openxmlformats.org/markup-compatibility/2006">
               <mc:Choice xmlns:v="urn:schemas-microsoft-com:vml" Requires="v">
-                <p:oleObj spid="_x0000_s3159" name="Equation" r:id="rId5" imgW="2755800" imgH="1384200" progId="Equation.DSMT4">
+                <p:oleObj spid="_x0000_s3162" name="Equation" r:id="rId5" imgW="2755800" imgH="1384200" progId="Equation.DSMT4">
                   <p:embed/>
                 </p:oleObj>
               </mc:Choice>
@@ -3367,7 +3367,7 @@
           <a:graphicData uri="http://schemas.openxmlformats.org/presentationml/2006/ole">
             <mc:AlternateContent xmlns:mc="http://schemas.openxmlformats.org/markup-compatibility/2006">
               <mc:Choice xmlns:v="urn:schemas-microsoft-com:vml" Requires="v">
-                <p:oleObj spid="_x0000_s3160" name="Equation" r:id="rId7" imgW="6019560" imgH="965160" progId="Equation.DSMT4">
+                <p:oleObj spid="_x0000_s3163" name="Equation" r:id="rId7" imgW="6019560" imgH="965160" progId="Equation.DSMT4">
                   <p:embed/>
                 </p:oleObj>
               </mc:Choice>
@@ -3609,7 +3609,7 @@
           <a:graphicData uri="http://schemas.openxmlformats.org/presentationml/2006/ole">
             <mc:AlternateContent xmlns:mc="http://schemas.openxmlformats.org/markup-compatibility/2006">
               <mc:Choice xmlns:v="urn:schemas-microsoft-com:vml" Requires="v">
-                <p:oleObj spid="_x0000_s5173" name="Equation" r:id="rId3" imgW="6210000" imgH="1981080" progId="Equation.DSMT4">
+                <p:oleObj spid="_x0000_s5175" name="Equation" r:id="rId3" imgW="6210000" imgH="1981080" progId="Equation.DSMT4">
                   <p:embed/>
                 </p:oleObj>
               </mc:Choice>
@@ -3671,7 +3671,7 @@
           <a:graphicData uri="http://schemas.openxmlformats.org/presentationml/2006/ole">
             <mc:AlternateContent xmlns:mc="http://schemas.openxmlformats.org/markup-compatibility/2006">
               <mc:Choice xmlns:v="urn:schemas-microsoft-com:vml" Requires="v">
-                <p:oleObj spid="_x0000_s5174" name="Equation" r:id="rId5" imgW="3047760" imgH="1409400" progId="Equation.DSMT4">
+                <p:oleObj spid="_x0000_s5176" name="Equation" r:id="rId5" imgW="3047760" imgH="1409400" progId="Equation.DSMT4">
                   <p:embed/>
                 </p:oleObj>
               </mc:Choice>
@@ -3837,7 +3837,7 @@
             <a:graphicData uri="http://schemas.openxmlformats.org/presentationml/2006/ole">
               <mc:AlternateContent xmlns:mc="http://schemas.openxmlformats.org/markup-compatibility/2006">
                 <mc:Choice xmlns:v="urn:schemas-microsoft-com:vml" Requires="v">
-                  <p:oleObj spid="_x0000_s6206" name="Equation" r:id="rId3" imgW="2844720" imgH="3124080" progId="Equation.DSMT4">
+                  <p:oleObj spid="_x0000_s6209" name="Equation" r:id="rId3" imgW="2844720" imgH="3124080" progId="Equation.DSMT4">
                     <p:embed/>
                   </p:oleObj>
                 </mc:Choice>
@@ -3900,7 +3900,7 @@
           <a:graphicData uri="http://schemas.openxmlformats.org/presentationml/2006/ole">
             <mc:AlternateContent xmlns:mc="http://schemas.openxmlformats.org/markup-compatibility/2006">
               <mc:Choice xmlns:v="urn:schemas-microsoft-com:vml" Requires="v">
-                <p:oleObj spid="_x0000_s6207" name="Equation" r:id="rId5" imgW="3047760" imgH="1409400" progId="Equation.DSMT4">
+                <p:oleObj spid="_x0000_s6210" name="Equation" r:id="rId5" imgW="3047760" imgH="1409400" progId="Equation.DSMT4">
                   <p:embed/>
                 </p:oleObj>
               </mc:Choice>
@@ -3962,7 +3962,7 @@
           <a:graphicData uri="http://schemas.openxmlformats.org/presentationml/2006/ole">
             <mc:AlternateContent xmlns:mc="http://schemas.openxmlformats.org/markup-compatibility/2006">
               <mc:Choice xmlns:v="urn:schemas-microsoft-com:vml" Requires="v">
-                <p:oleObj spid="_x0000_s6208" name="Equation" r:id="rId7" imgW="2882880" imgH="3073320" progId="Equation.DSMT4">
+                <p:oleObj spid="_x0000_s6211" name="Equation" r:id="rId7" imgW="2882880" imgH="3073320" progId="Equation.DSMT4">
                   <p:embed/>
                 </p:oleObj>
               </mc:Choice>
@@ -6655,7 +6655,7 @@
           <a:graphicData uri="http://schemas.openxmlformats.org/presentationml/2006/ole">
             <mc:AlternateContent xmlns:mc="http://schemas.openxmlformats.org/markup-compatibility/2006">
               <mc:Choice xmlns:v="urn:schemas-microsoft-com:vml" Requires="v">
-                <p:oleObj spid="_x0000_s1211" name="Equation" r:id="rId5" imgW="1536480" imgH="457200" progId="Equation.DSMT4">
+                <p:oleObj spid="_x0000_s1217" name="Equation" r:id="rId5" imgW="1536480" imgH="457200" progId="Equation.DSMT4">
                   <p:embed/>
                 </p:oleObj>
               </mc:Choice>
@@ -6801,7 +6801,7 @@
           <a:graphicData uri="http://schemas.openxmlformats.org/presentationml/2006/ole">
             <mc:AlternateContent xmlns:mc="http://schemas.openxmlformats.org/markup-compatibility/2006">
               <mc:Choice xmlns:v="urn:schemas-microsoft-com:vml" Requires="v">
-                <p:oleObj spid="_x0000_s1212" name="Equation" r:id="rId7" imgW="1269720" imgH="419040" progId="Equation.DSMT4">
+                <p:oleObj spid="_x0000_s1218" name="Equation" r:id="rId7" imgW="1269720" imgH="419040" progId="Equation.DSMT4">
                   <p:embed/>
                 </p:oleObj>
               </mc:Choice>
@@ -6858,7 +6858,7 @@
           <a:graphicData uri="http://schemas.openxmlformats.org/presentationml/2006/ole">
             <mc:AlternateContent xmlns:mc="http://schemas.openxmlformats.org/markup-compatibility/2006">
               <mc:Choice xmlns:v="urn:schemas-microsoft-com:vml" Requires="v">
-                <p:oleObj spid="_x0000_s1213" name="Equation" r:id="rId9" imgW="2705040" imgH="1434960" progId="Equation.DSMT4">
+                <p:oleObj spid="_x0000_s1219" name="Equation" r:id="rId9" imgW="2705040" imgH="1434960" progId="Equation.DSMT4">
                   <p:embed/>
                 </p:oleObj>
               </mc:Choice>
@@ -6920,7 +6920,7 @@
           <a:graphicData uri="http://schemas.openxmlformats.org/presentationml/2006/ole">
             <mc:AlternateContent xmlns:mc="http://schemas.openxmlformats.org/markup-compatibility/2006">
               <mc:Choice xmlns:v="urn:schemas-microsoft-com:vml" Requires="v">
-                <p:oleObj spid="_x0000_s1214" name="Equation" r:id="rId11" imgW="2882880" imgH="1447560" progId="Equation.DSMT4">
+                <p:oleObj spid="_x0000_s1220" name="Equation" r:id="rId11" imgW="2882880" imgH="1447560" progId="Equation.DSMT4">
                   <p:embed/>
                 </p:oleObj>
               </mc:Choice>
@@ -6982,7 +6982,7 @@
           <a:graphicData uri="http://schemas.openxmlformats.org/presentationml/2006/ole">
             <mc:AlternateContent xmlns:mc="http://schemas.openxmlformats.org/markup-compatibility/2006">
               <mc:Choice xmlns:v="urn:schemas-microsoft-com:vml" Requires="v">
-                <p:oleObj spid="_x0000_s1215" name="Equation" r:id="rId13" imgW="1562040" imgH="482400" progId="Equation.DSMT4">
+                <p:oleObj spid="_x0000_s1221" name="Equation" r:id="rId13" imgW="1562040" imgH="482400" progId="Equation.DSMT4">
                   <p:embed/>
                 </p:oleObj>
               </mc:Choice>
@@ -7039,7 +7039,7 @@
           <a:graphicData uri="http://schemas.openxmlformats.org/presentationml/2006/ole">
             <mc:AlternateContent xmlns:mc="http://schemas.openxmlformats.org/markup-compatibility/2006">
               <mc:Choice xmlns:v="urn:schemas-microsoft-com:vml" Requires="v">
-                <p:oleObj spid="_x0000_s1216" name="Equation" r:id="rId15" imgW="4787640" imgH="482400" progId="Equation.DSMT4">
+                <p:oleObj spid="_x0000_s1222" name="Equation" r:id="rId15" imgW="4787640" imgH="482400" progId="Equation.DSMT4">
                   <p:embed/>
                 </p:oleObj>
               </mc:Choice>

</xml_diff>